<commit_message>
modifications des documents relecture
</commit_message>
<xml_diff>
--- a/LDS_Block_2_Lead.pptx
+++ b/LDS_Block_2_Lead.pptx
@@ -284,7 +284,7 @@
   </p:defaultTextStyle>
   <p:extLst>
     <p:ext uri="GoogleSlidesCustomDataVersion2">
-      <go:slidesCustomData xmlns:go="http://customooxmlschemas.google.com/" r:id="rId40" roundtripDataSignature="AMtx7miB6Jf62VujByauEVslFxIGYOtrOw=="/>
+      <go:slidesCustomData xmlns:go="http://customooxmlschemas.google.com/" r:id="rId40" roundtripDataSignature="AMtx7midtZIVGHcQq0aBEucYfwR4UbR72A=="/>
     </p:ext>
   </p:extLst>
 </p:presentation>
@@ -12319,7 +12319,7 @@
             </a:r>
             <a:r>
               <a:rPr lang="fr" sz="1000"/>
-              <a:t> (entiers) pour joins rapides.</a:t>
+              <a:t> (entiers) pour jointures rapides.</a:t>
             </a:r>
             <a:endParaRPr sz="1000"/>
           </a:p>
@@ -13382,7 +13382,7 @@
                   <a:srgbClr val="000000"/>
                 </a:solidFill>
               </a:rPr>
-              <a:t>Centralise les retours clients (note, commentaire, sentiment). Index texte pour analyse sémantique (NLP).</a:t>
+              <a:t>Centralise les retours clients (notes, commentaire, sentiment). Index texte pour analyse sémantique (NLP).</a:t>
             </a:r>
             <a:endParaRPr sz="900">
               <a:solidFill>
@@ -15358,7 +15358,7 @@
             <a:tbl>
               <a:tblPr>
                 <a:noFill/>
-                <a:tableStyleId>{66992DCF-B60A-47D9-B024-17E8E8111B95}</a:tableStyleId>
+                <a:tableStyleId>{BE7BAECF-0930-45FF-A327-501D9C347953}</a:tableStyleId>
               </a:tblPr>
               <a:tblGrid>
                 <a:gridCol w="2413000"/>
@@ -16475,33 +16475,6 @@
               <a:buNone/>
             </a:pPr>
             <a:r>
-              <a:rPr lang="fr" sz="1100"/>
-              <a:t>En </a:t>
-            </a:r>
-            <a:r>
-              <a:rPr lang="fr" sz="1100"/>
-              <a:t>résumé</a:t>
-            </a:r>
-            <a:r>
-              <a:rPr lang="fr" sz="1100"/>
-              <a:t> : </a:t>
-            </a:r>
-            <a:endParaRPr sz="1100"/>
-          </a:p>
-          <a:p>
-            <a:pPr indent="0" lvl="0" marL="457200" rtl="0" algn="l">
-              <a:lnSpc>
-                <a:spcPct val="115000"/>
-              </a:lnSpc>
-              <a:spcBef>
-                <a:spcPts val="1200"/>
-              </a:spcBef>
-              <a:spcAft>
-                <a:spcPts val="0"/>
-              </a:spcAft>
-              <a:buNone/>
-            </a:pPr>
-            <a:r>
               <a:rPr b="1" lang="fr" sz="1100"/>
               <a:t>Chiffrement global </a:t>
             </a:r>
@@ -16616,7 +16589,7 @@
             </a:r>
             <a:r>
               <a:rPr lang="fr" sz="1100"/>
-              <a:t> : pseudonymisation, droit à l’oubli automatisé, rétention  des données.</a:t>
+              <a:t> : pseudonymisation, droit à l’oubli automatisé, rétention des données.</a:t>
             </a:r>
             <a:endParaRPr sz="1100"/>
           </a:p>
@@ -20579,7 +20552,7 @@
                   <a:schemeClr val="lt1"/>
                 </a:solidFill>
               </a:rPr>
-              <a:t>	Snowflake pour la performance analytique et la gouvernance,</a:t>
+              <a:t>	Snowflake pour la performance analytique,</a:t>
             </a:r>
             <a:br>
               <a:rPr b="1" lang="fr" sz="1000">
@@ -20786,7 +20759,7 @@
                   <a:schemeClr val="lt1"/>
                 </a:solidFill>
               </a:rPr>
-              <a:t>Projet complet très intéressant car en entreprise je n’ai pas eu l’occasion  de mettre en place une architecture complète comme celle ci, ni de rentrer dans le détail des schéma de base de données. Je comprends mieux un collègue architecte dans ce domaine maintenant :-)</a:t>
+              <a:t>Projet complet très intéressant car en entreprise je n’ai pas eu l’occasion  de mettre en place une architecture complète comme celle ci, ni de rentrer dans le détail des schémas de base de données. Je comprends mieux un collègue architecte dans ce domaine maintenant :-)</a:t>
             </a:r>
             <a:endParaRPr b="1" sz="1000">
               <a:solidFill>
@@ -21235,8 +21208,8 @@
         </p:blipFill>
         <p:spPr>
           <a:xfrm>
-            <a:off x="1643950" y="837900"/>
-            <a:ext cx="4513676" cy="4305599"/>
+            <a:off x="1336275" y="698875"/>
+            <a:ext cx="4561694" cy="4305599"/>
           </a:xfrm>
           <a:prstGeom prst="rect">
             <a:avLst/>
@@ -21516,7 +21489,15 @@
             </a:r>
             <a:r>
               <a:rPr lang="fr" sz="1100"/>
-              <a:t> (zones </a:t>
+              <a:t> (</a:t>
+            </a:r>
+            <a:r>
+              <a:rPr lang="fr" sz="1100"/>
+              <a:t>schémas</a:t>
+            </a:r>
+            <a:r>
+              <a:rPr lang="fr" sz="1100"/>
+              <a:t> </a:t>
             </a:r>
             <a:r>
               <a:rPr i="1" lang="fr" sz="1100"/>
@@ -21593,6 +21574,14 @@
             <a:r>
               <a:rPr lang="fr" sz="1100"/>
               <a:t>	</a:t>
+            </a:r>
+            <a:r>
+              <a:rPr b="1" lang="fr" sz="1100"/>
+              <a:t>Jenkins +</a:t>
+            </a:r>
+            <a:r>
+              <a:rPr lang="fr" sz="1100"/>
+              <a:t> </a:t>
             </a:r>
             <a:r>
               <a:rPr b="1" lang="fr" sz="1100"/>
@@ -23268,7 +23257,7 @@
             <a:tbl>
               <a:tblPr>
                 <a:noFill/>
-                <a:tableStyleId>{6842F186-137E-487E-8AAD-9096ED8008A9}</a:tableStyleId>
+                <a:tableStyleId>{D707D63A-4602-4082-8AFF-98E450A7B0E3}</a:tableStyleId>
               </a:tblPr>
               <a:tblGrid>
                 <a:gridCol w="1235625"/>
@@ -24976,8 +24965,8 @@
         </p:blipFill>
         <p:spPr>
           <a:xfrm>
-            <a:off x="961025" y="428050"/>
-            <a:ext cx="7309900" cy="4757600"/>
+            <a:off x="1313224" y="498225"/>
+            <a:ext cx="5622800" cy="4504825"/>
           </a:xfrm>
           <a:prstGeom prst="rect">
             <a:avLst/>
@@ -24997,6 +24986,285 @@
 </file>
 
 <file path=ppt/theme/theme1.xml><?xml version="1.0" encoding="utf-8"?>
+<a:theme xmlns:a="http://schemas.openxmlformats.org/drawingml/2006/main" xmlns:r="http://schemas.openxmlformats.org/officeDocument/2006/relationships" name="Simple Light">
+  <a:themeElements>
+    <a:clrScheme name="Simple Light">
+      <a:dk1>
+        <a:srgbClr val="000000"/>
+      </a:dk1>
+      <a:lt1>
+        <a:srgbClr val="FFFFFF"/>
+      </a:lt1>
+      <a:dk2>
+        <a:srgbClr val="595959"/>
+      </a:dk2>
+      <a:lt2>
+        <a:srgbClr val="EEEEEE"/>
+      </a:lt2>
+      <a:accent1>
+        <a:srgbClr val="FFAB40"/>
+      </a:accent1>
+      <a:accent2>
+        <a:srgbClr val="212121"/>
+      </a:accent2>
+      <a:accent3>
+        <a:srgbClr val="78909C"/>
+      </a:accent3>
+      <a:accent4>
+        <a:srgbClr val="FFAB40"/>
+      </a:accent4>
+      <a:accent5>
+        <a:srgbClr val="0097A7"/>
+      </a:accent5>
+      <a:accent6>
+        <a:srgbClr val="EEFF41"/>
+      </a:accent6>
+      <a:hlink>
+        <a:srgbClr val="0097A7"/>
+      </a:hlink>
+      <a:folHlink>
+        <a:srgbClr val="0097A7"/>
+      </a:folHlink>
+    </a:clrScheme>
+    <a:fontScheme name="Office">
+      <a:majorFont>
+        <a:latin typeface="Arial"/>
+        <a:ea typeface=""/>
+        <a:cs typeface=""/>
+        <a:font script="Jpan" typeface="ＭＳ Ｐゴシック"/>
+        <a:font script="Hang" typeface="맑은 고딕"/>
+        <a:font script="Hans" typeface="宋体"/>
+        <a:font script="Hant" typeface="新細明體"/>
+        <a:font script="Arab" typeface="Times New Roman"/>
+        <a:font script="Hebr" typeface="Times New Roman"/>
+        <a:font script="Thai" typeface="Angsana New"/>
+        <a:font script="Ethi" typeface="Nyala"/>
+        <a:font script="Beng" typeface="Vrinda"/>
+        <a:font script="Gujr" typeface="Shruti"/>
+        <a:font script="Khmr" typeface="MoolBoran"/>
+        <a:font script="Knda" typeface="Tunga"/>
+        <a:font script="Guru" typeface="Raavi"/>
+        <a:font script="Cans" typeface="Euphemia"/>
+        <a:font script="Cher" typeface="Plantagenet Cherokee"/>
+        <a:font script="Yiii" typeface="Microsoft Yi Baiti"/>
+        <a:font script="Tibt" typeface="Microsoft Himalaya"/>
+        <a:font script="Thaa" typeface="MV Boli"/>
+        <a:font script="Deva" typeface="Mangal"/>
+        <a:font script="Telu" typeface="Gautami"/>
+        <a:font script="Taml" typeface="Latha"/>
+        <a:font script="Syrc" typeface="Estrangelo Edessa"/>
+        <a:font script="Orya" typeface="Kalinga"/>
+        <a:font script="Mlym" typeface="Kartika"/>
+        <a:font script="Laoo" typeface="DokChampa"/>
+        <a:font script="Sinh" typeface="Iskoola Pota"/>
+        <a:font script="Mong" typeface="Mongolian Baiti"/>
+        <a:font script="Viet" typeface="Times New Roman"/>
+        <a:font script="Uigh" typeface="Microsoft Uighur"/>
+        <a:font script="Geor" typeface="Sylfaen"/>
+      </a:majorFont>
+      <a:minorFont>
+        <a:latin typeface="Arial"/>
+        <a:ea typeface=""/>
+        <a:cs typeface=""/>
+        <a:font script="Jpan" typeface="ＭＳ Ｐゴシック"/>
+        <a:font script="Hang" typeface="맑은 고딕"/>
+        <a:font script="Hans" typeface="宋体"/>
+        <a:font script="Hant" typeface="新細明體"/>
+        <a:font script="Arab" typeface="Arial"/>
+        <a:font script="Hebr" typeface="Arial"/>
+        <a:font script="Thai" typeface="Cordia New"/>
+        <a:font script="Ethi" typeface="Nyala"/>
+        <a:font script="Beng" typeface="Vrinda"/>
+        <a:font script="Gujr" typeface="Shruti"/>
+        <a:font script="Khmr" typeface="DaunPenh"/>
+        <a:font script="Knda" typeface="Tunga"/>
+        <a:font script="Guru" typeface="Raavi"/>
+        <a:font script="Cans" typeface="Euphemia"/>
+        <a:font script="Cher" typeface="Plantagenet Cherokee"/>
+        <a:font script="Yiii" typeface="Microsoft Yi Baiti"/>
+        <a:font script="Tibt" typeface="Microsoft Himalaya"/>
+        <a:font script="Thaa" typeface="MV Boli"/>
+        <a:font script="Deva" typeface="Mangal"/>
+        <a:font script="Telu" typeface="Gautami"/>
+        <a:font script="Taml" typeface="Latha"/>
+        <a:font script="Syrc" typeface="Estrangelo Edessa"/>
+        <a:font script="Orya" typeface="Kalinga"/>
+        <a:font script="Mlym" typeface="Kartika"/>
+        <a:font script="Laoo" typeface="DokChampa"/>
+        <a:font script="Sinh" typeface="Iskoola Pota"/>
+        <a:font script="Mong" typeface="Mongolian Baiti"/>
+        <a:font script="Viet" typeface="Arial"/>
+        <a:font script="Uigh" typeface="Microsoft Uighur"/>
+        <a:font script="Geor" typeface="Sylfaen"/>
+      </a:minorFont>
+    </a:fontScheme>
+    <a:fmtScheme name="Office">
+      <a:fillStyleLst>
+        <a:solidFill>
+          <a:schemeClr val="phClr"/>
+        </a:solidFill>
+        <a:gradFill rotWithShape="1">
+          <a:gsLst>
+            <a:gs pos="0">
+              <a:schemeClr val="phClr">
+                <a:tint val="50000"/>
+                <a:satMod val="300000"/>
+              </a:schemeClr>
+            </a:gs>
+            <a:gs pos="35000">
+              <a:schemeClr val="phClr">
+                <a:tint val="37000"/>
+                <a:satMod val="300000"/>
+              </a:schemeClr>
+            </a:gs>
+            <a:gs pos="100000">
+              <a:schemeClr val="phClr">
+                <a:tint val="15000"/>
+                <a:satMod val="350000"/>
+              </a:schemeClr>
+            </a:gs>
+          </a:gsLst>
+          <a:lin ang="16200000" scaled="1"/>
+        </a:gradFill>
+        <a:gradFill rotWithShape="1">
+          <a:gsLst>
+            <a:gs pos="0">
+              <a:schemeClr val="phClr">
+                <a:tint val="100000"/>
+                <a:shade val="100000"/>
+                <a:satMod val="130000"/>
+              </a:schemeClr>
+            </a:gs>
+            <a:gs pos="100000">
+              <a:schemeClr val="phClr">
+                <a:tint val="50000"/>
+                <a:shade val="100000"/>
+                <a:satMod val="350000"/>
+              </a:schemeClr>
+            </a:gs>
+          </a:gsLst>
+          <a:lin ang="16200000" scaled="0"/>
+        </a:gradFill>
+      </a:fillStyleLst>
+      <a:lnStyleLst>
+        <a:ln w="9525" cap="flat" cmpd="sng" algn="ctr">
+          <a:solidFill>
+            <a:schemeClr val="phClr">
+              <a:shade val="95000"/>
+              <a:satMod val="105000"/>
+            </a:schemeClr>
+          </a:solidFill>
+          <a:prstDash val="solid"/>
+        </a:ln>
+        <a:ln w="25400" cap="flat" cmpd="sng" algn="ctr">
+          <a:solidFill>
+            <a:schemeClr val="phClr"/>
+          </a:solidFill>
+          <a:prstDash val="solid"/>
+        </a:ln>
+        <a:ln w="38100" cap="flat" cmpd="sng" algn="ctr">
+          <a:solidFill>
+            <a:schemeClr val="phClr"/>
+          </a:solidFill>
+          <a:prstDash val="solid"/>
+        </a:ln>
+      </a:lnStyleLst>
+      <a:effectStyleLst>
+        <a:effectStyle>
+          <a:effectLst>
+            <a:outerShdw blurRad="40000" dist="20000" dir="5400000" rotWithShape="0">
+              <a:srgbClr val="000000">
+                <a:alpha val="38000"/>
+              </a:srgbClr>
+            </a:outerShdw>
+          </a:effectLst>
+        </a:effectStyle>
+        <a:effectStyle>
+          <a:effectLst>
+            <a:outerShdw blurRad="40000" dist="23000" dir="5400000" rotWithShape="0">
+              <a:srgbClr val="000000">
+                <a:alpha val="35000"/>
+              </a:srgbClr>
+            </a:outerShdw>
+          </a:effectLst>
+        </a:effectStyle>
+        <a:effectStyle>
+          <a:effectLst>
+            <a:outerShdw blurRad="40000" dist="23000" dir="5400000" rotWithShape="0">
+              <a:srgbClr val="000000">
+                <a:alpha val="35000"/>
+              </a:srgbClr>
+            </a:outerShdw>
+          </a:effectLst>
+          <a:scene3d>
+            <a:camera prst="orthographicFront">
+              <a:rot lat="0" lon="0" rev="0"/>
+            </a:camera>
+            <a:lightRig rig="threePt" dir="t">
+              <a:rot lat="0" lon="0" rev="1200000"/>
+            </a:lightRig>
+          </a:scene3d>
+          <a:sp3d>
+            <a:bevelT w="63500" h="25400"/>
+          </a:sp3d>
+        </a:effectStyle>
+      </a:effectStyleLst>
+      <a:bgFillStyleLst>
+        <a:solidFill>
+          <a:schemeClr val="phClr"/>
+        </a:solidFill>
+        <a:gradFill rotWithShape="1">
+          <a:gsLst>
+            <a:gs pos="0">
+              <a:schemeClr val="phClr">
+                <a:tint val="40000"/>
+                <a:satMod val="350000"/>
+              </a:schemeClr>
+            </a:gs>
+            <a:gs pos="40000">
+              <a:schemeClr val="phClr">
+                <a:tint val="45000"/>
+                <a:shade val="99000"/>
+                <a:satMod val="350000"/>
+              </a:schemeClr>
+            </a:gs>
+            <a:gs pos="100000">
+              <a:schemeClr val="phClr">
+                <a:shade val="20000"/>
+                <a:satMod val="255000"/>
+              </a:schemeClr>
+            </a:gs>
+          </a:gsLst>
+          <a:path path="circle">
+            <a:fillToRect l="50000" t="-80000" r="50000" b="180000"/>
+          </a:path>
+        </a:gradFill>
+        <a:gradFill rotWithShape="1">
+          <a:gsLst>
+            <a:gs pos="0">
+              <a:schemeClr val="phClr">
+                <a:tint val="80000"/>
+                <a:satMod val="300000"/>
+              </a:schemeClr>
+            </a:gs>
+            <a:gs pos="100000">
+              <a:schemeClr val="phClr">
+                <a:shade val="30000"/>
+                <a:satMod val="200000"/>
+              </a:schemeClr>
+            </a:gs>
+          </a:gsLst>
+          <a:path path="circle">
+            <a:fillToRect l="50000" t="50000" r="50000" b="50000"/>
+          </a:path>
+        </a:gradFill>
+      </a:bgFillStyleLst>
+    </a:fmtScheme>
+  </a:themeElements>
+</a:theme>
+</file>
+
+<file path=ppt/theme/theme2.xml><?xml version="1.0" encoding="utf-8"?>
 <a:theme xmlns:a="http://schemas.openxmlformats.org/drawingml/2006/main" xmlns:r="http://schemas.openxmlformats.org/officeDocument/2006/relationships">
   <a:themeElements>
     <a:clrScheme name="Default">
@@ -25273,283 +25541,4 @@
     </a:fmtScheme>
   </a:themeElements>
 </a:theme>
-</file>
-
-<file path=ppt/theme/theme2.xml><?xml version="1.0" encoding="utf-8"?>
-<a:theme xmlns:a="http://schemas.openxmlformats.org/drawingml/2006/main" xmlns:r="http://schemas.openxmlformats.org/officeDocument/2006/relationships" name="Simple Light">
-  <a:themeElements>
-    <a:clrScheme name="Simple Light">
-      <a:dk1>
-        <a:srgbClr val="000000"/>
-      </a:dk1>
-      <a:lt1>
-        <a:srgbClr val="FFFFFF"/>
-      </a:lt1>
-      <a:dk2>
-        <a:srgbClr val="595959"/>
-      </a:dk2>
-      <a:lt2>
-        <a:srgbClr val="EEEEEE"/>
-      </a:lt2>
-      <a:accent1>
-        <a:srgbClr val="FFAB40"/>
-      </a:accent1>
-      <a:accent2>
-        <a:srgbClr val="212121"/>
-      </a:accent2>
-      <a:accent3>
-        <a:srgbClr val="78909C"/>
-      </a:accent3>
-      <a:accent4>
-        <a:srgbClr val="FFAB40"/>
-      </a:accent4>
-      <a:accent5>
-        <a:srgbClr val="0097A7"/>
-      </a:accent5>
-      <a:accent6>
-        <a:srgbClr val="EEFF41"/>
-      </a:accent6>
-      <a:hlink>
-        <a:srgbClr val="0097A7"/>
-      </a:hlink>
-      <a:folHlink>
-        <a:srgbClr val="0097A7"/>
-      </a:folHlink>
-    </a:clrScheme>
-    <a:fontScheme name="Office">
-      <a:majorFont>
-        <a:latin typeface="Arial"/>
-        <a:ea typeface=""/>
-        <a:cs typeface=""/>
-        <a:font script="Jpan" typeface="ＭＳ Ｐゴシック"/>
-        <a:font script="Hang" typeface="맑은 고딕"/>
-        <a:font script="Hans" typeface="宋体"/>
-        <a:font script="Hant" typeface="新細明體"/>
-        <a:font script="Arab" typeface="Times New Roman"/>
-        <a:font script="Hebr" typeface="Times New Roman"/>
-        <a:font script="Thai" typeface="Angsana New"/>
-        <a:font script="Ethi" typeface="Nyala"/>
-        <a:font script="Beng" typeface="Vrinda"/>
-        <a:font script="Gujr" typeface="Shruti"/>
-        <a:font script="Khmr" typeface="MoolBoran"/>
-        <a:font script="Knda" typeface="Tunga"/>
-        <a:font script="Guru" typeface="Raavi"/>
-        <a:font script="Cans" typeface="Euphemia"/>
-        <a:font script="Cher" typeface="Plantagenet Cherokee"/>
-        <a:font script="Yiii" typeface="Microsoft Yi Baiti"/>
-        <a:font script="Tibt" typeface="Microsoft Himalaya"/>
-        <a:font script="Thaa" typeface="MV Boli"/>
-        <a:font script="Deva" typeface="Mangal"/>
-        <a:font script="Telu" typeface="Gautami"/>
-        <a:font script="Taml" typeface="Latha"/>
-        <a:font script="Syrc" typeface="Estrangelo Edessa"/>
-        <a:font script="Orya" typeface="Kalinga"/>
-        <a:font script="Mlym" typeface="Kartika"/>
-        <a:font script="Laoo" typeface="DokChampa"/>
-        <a:font script="Sinh" typeface="Iskoola Pota"/>
-        <a:font script="Mong" typeface="Mongolian Baiti"/>
-        <a:font script="Viet" typeface="Times New Roman"/>
-        <a:font script="Uigh" typeface="Microsoft Uighur"/>
-        <a:font script="Geor" typeface="Sylfaen"/>
-      </a:majorFont>
-      <a:minorFont>
-        <a:latin typeface="Arial"/>
-        <a:ea typeface=""/>
-        <a:cs typeface=""/>
-        <a:font script="Jpan" typeface="ＭＳ Ｐゴシック"/>
-        <a:font script="Hang" typeface="맑은 고딕"/>
-        <a:font script="Hans" typeface="宋体"/>
-        <a:font script="Hant" typeface="新細明體"/>
-        <a:font script="Arab" typeface="Arial"/>
-        <a:font script="Hebr" typeface="Arial"/>
-        <a:font script="Thai" typeface="Cordia New"/>
-        <a:font script="Ethi" typeface="Nyala"/>
-        <a:font script="Beng" typeface="Vrinda"/>
-        <a:font script="Gujr" typeface="Shruti"/>
-        <a:font script="Khmr" typeface="DaunPenh"/>
-        <a:font script="Knda" typeface="Tunga"/>
-        <a:font script="Guru" typeface="Raavi"/>
-        <a:font script="Cans" typeface="Euphemia"/>
-        <a:font script="Cher" typeface="Plantagenet Cherokee"/>
-        <a:font script="Yiii" typeface="Microsoft Yi Baiti"/>
-        <a:font script="Tibt" typeface="Microsoft Himalaya"/>
-        <a:font script="Thaa" typeface="MV Boli"/>
-        <a:font script="Deva" typeface="Mangal"/>
-        <a:font script="Telu" typeface="Gautami"/>
-        <a:font script="Taml" typeface="Latha"/>
-        <a:font script="Syrc" typeface="Estrangelo Edessa"/>
-        <a:font script="Orya" typeface="Kalinga"/>
-        <a:font script="Mlym" typeface="Kartika"/>
-        <a:font script="Laoo" typeface="DokChampa"/>
-        <a:font script="Sinh" typeface="Iskoola Pota"/>
-        <a:font script="Mong" typeface="Mongolian Baiti"/>
-        <a:font script="Viet" typeface="Arial"/>
-        <a:font script="Uigh" typeface="Microsoft Uighur"/>
-        <a:font script="Geor" typeface="Sylfaen"/>
-      </a:minorFont>
-    </a:fontScheme>
-    <a:fmtScheme name="Office">
-      <a:fillStyleLst>
-        <a:solidFill>
-          <a:schemeClr val="phClr"/>
-        </a:solidFill>
-        <a:gradFill rotWithShape="1">
-          <a:gsLst>
-            <a:gs pos="0">
-              <a:schemeClr val="phClr">
-                <a:tint val="50000"/>
-                <a:satMod val="300000"/>
-              </a:schemeClr>
-            </a:gs>
-            <a:gs pos="35000">
-              <a:schemeClr val="phClr">
-                <a:tint val="37000"/>
-                <a:satMod val="300000"/>
-              </a:schemeClr>
-            </a:gs>
-            <a:gs pos="100000">
-              <a:schemeClr val="phClr">
-                <a:tint val="15000"/>
-                <a:satMod val="350000"/>
-              </a:schemeClr>
-            </a:gs>
-          </a:gsLst>
-          <a:lin ang="16200000" scaled="1"/>
-        </a:gradFill>
-        <a:gradFill rotWithShape="1">
-          <a:gsLst>
-            <a:gs pos="0">
-              <a:schemeClr val="phClr">
-                <a:tint val="100000"/>
-                <a:shade val="100000"/>
-                <a:satMod val="130000"/>
-              </a:schemeClr>
-            </a:gs>
-            <a:gs pos="100000">
-              <a:schemeClr val="phClr">
-                <a:tint val="50000"/>
-                <a:shade val="100000"/>
-                <a:satMod val="350000"/>
-              </a:schemeClr>
-            </a:gs>
-          </a:gsLst>
-          <a:lin ang="16200000" scaled="0"/>
-        </a:gradFill>
-      </a:fillStyleLst>
-      <a:lnStyleLst>
-        <a:ln w="9525" cap="flat" cmpd="sng" algn="ctr">
-          <a:solidFill>
-            <a:schemeClr val="phClr">
-              <a:shade val="95000"/>
-              <a:satMod val="105000"/>
-            </a:schemeClr>
-          </a:solidFill>
-          <a:prstDash val="solid"/>
-        </a:ln>
-        <a:ln w="25400" cap="flat" cmpd="sng" algn="ctr">
-          <a:solidFill>
-            <a:schemeClr val="phClr"/>
-          </a:solidFill>
-          <a:prstDash val="solid"/>
-        </a:ln>
-        <a:ln w="38100" cap="flat" cmpd="sng" algn="ctr">
-          <a:solidFill>
-            <a:schemeClr val="phClr"/>
-          </a:solidFill>
-          <a:prstDash val="solid"/>
-        </a:ln>
-      </a:lnStyleLst>
-      <a:effectStyleLst>
-        <a:effectStyle>
-          <a:effectLst>
-            <a:outerShdw blurRad="40000" dist="20000" dir="5400000" rotWithShape="0">
-              <a:srgbClr val="000000">
-                <a:alpha val="38000"/>
-              </a:srgbClr>
-            </a:outerShdw>
-          </a:effectLst>
-        </a:effectStyle>
-        <a:effectStyle>
-          <a:effectLst>
-            <a:outerShdw blurRad="40000" dist="23000" dir="5400000" rotWithShape="0">
-              <a:srgbClr val="000000">
-                <a:alpha val="35000"/>
-              </a:srgbClr>
-            </a:outerShdw>
-          </a:effectLst>
-        </a:effectStyle>
-        <a:effectStyle>
-          <a:effectLst>
-            <a:outerShdw blurRad="40000" dist="23000" dir="5400000" rotWithShape="0">
-              <a:srgbClr val="000000">
-                <a:alpha val="35000"/>
-              </a:srgbClr>
-            </a:outerShdw>
-          </a:effectLst>
-          <a:scene3d>
-            <a:camera prst="orthographicFront">
-              <a:rot lat="0" lon="0" rev="0"/>
-            </a:camera>
-            <a:lightRig rig="threePt" dir="t">
-              <a:rot lat="0" lon="0" rev="1200000"/>
-            </a:lightRig>
-          </a:scene3d>
-          <a:sp3d>
-            <a:bevelT w="63500" h="25400"/>
-          </a:sp3d>
-        </a:effectStyle>
-      </a:effectStyleLst>
-      <a:bgFillStyleLst>
-        <a:solidFill>
-          <a:schemeClr val="phClr"/>
-        </a:solidFill>
-        <a:gradFill rotWithShape="1">
-          <a:gsLst>
-            <a:gs pos="0">
-              <a:schemeClr val="phClr">
-                <a:tint val="40000"/>
-                <a:satMod val="350000"/>
-              </a:schemeClr>
-            </a:gs>
-            <a:gs pos="40000">
-              <a:schemeClr val="phClr">
-                <a:tint val="45000"/>
-                <a:shade val="99000"/>
-                <a:satMod val="350000"/>
-              </a:schemeClr>
-            </a:gs>
-            <a:gs pos="100000">
-              <a:schemeClr val="phClr">
-                <a:shade val="20000"/>
-                <a:satMod val="255000"/>
-              </a:schemeClr>
-            </a:gs>
-          </a:gsLst>
-          <a:path path="circle">
-            <a:fillToRect l="50000" t="-80000" r="50000" b="180000"/>
-          </a:path>
-        </a:gradFill>
-        <a:gradFill rotWithShape="1">
-          <a:gsLst>
-            <a:gs pos="0">
-              <a:schemeClr val="phClr">
-                <a:tint val="80000"/>
-                <a:satMod val="300000"/>
-              </a:schemeClr>
-            </a:gs>
-            <a:gs pos="100000">
-              <a:schemeClr val="phClr">
-                <a:shade val="30000"/>
-                <a:satMod val="200000"/>
-              </a:schemeClr>
-            </a:gs>
-          </a:gsLst>
-          <a:path path="circle">
-            <a:fillToRect l="50000" t="50000" r="50000" b="50000"/>
-          </a:path>
-        </a:gradFill>
-      </a:bgFillStyleLst>
-    </a:fmtScheme>
-  </a:themeElements>
-</a:theme>
 </file>
</xml_diff>